<commit_message>
Added LDNG as Microservices - compare and contrast current vs Microservices slides
</commit_message>
<xml_diff>
--- a/ArchConf2015-takeaways-v2.pptx
+++ b/ArchConf2015-takeaways-v2.pptx
@@ -6265,7 +6265,7 @@
       </p:sp>
       <p:pic>
         <p:nvPicPr>
-          <p:cNvPr id="4" name="Picture 3"/>
+          <p:cNvPr id="3" name="Picture 2"/>
           <p:cNvPicPr>
             <a:picLocks noChangeAspect="1"/>
           </p:cNvPicPr>
@@ -6279,8 +6279,8 @@
         </p:blipFill>
         <p:spPr>
           <a:xfrm>
-            <a:off x="1028096" y="1777539"/>
-            <a:ext cx="7232952" cy="5080461"/>
+            <a:off x="887737" y="1445232"/>
+            <a:ext cx="7706051" cy="5412768"/>
           </a:xfrm>
           <a:prstGeom prst="rect">
             <a:avLst/>
@@ -6545,7 +6545,6 @@
               <a:rPr lang="en-US" dirty="0"/>
               <a:t>Agile Design · Scalable Systems · Microservices · Evolutionary Architecture · Distributed Systems · Continuous Delivery · Service-Based Architecture · Design Principles · Soft Skills · Web Application Security · Enterprise Messaging · Data Architecture · Architecture Patterns · Cloud Architectures · Measuring and Profiling · Modular Java</a:t>
             </a:r>
-            <a:endParaRPr lang="en-US" dirty="0"/>
           </a:p>
         </p:txBody>
       </p:sp>

</xml_diff>

<commit_message>
Replaced LDNG as Microservices with compressed picture.
</commit_message>
<xml_diff>
--- a/ArchConf2015-takeaways-v2.pptx
+++ b/ArchConf2015-takeaways-v2.pptx
@@ -6265,7 +6265,7 @@
       </p:sp>
       <p:pic>
         <p:nvPicPr>
-          <p:cNvPr id="3" name="Picture 2"/>
+          <p:cNvPr id="4" name="Picture 3"/>
           <p:cNvPicPr>
             <a:picLocks noChangeAspect="1"/>
           </p:cNvPicPr>
@@ -6279,8 +6279,8 @@
         </p:blipFill>
         <p:spPr>
           <a:xfrm>
-            <a:off x="887737" y="1445232"/>
-            <a:ext cx="7706051" cy="5412768"/>
+            <a:off x="0" y="2249277"/>
+            <a:ext cx="9144000" cy="4608723"/>
           </a:xfrm>
           <a:prstGeom prst="rect">
             <a:avLst/>

</xml_diff>